<commit_message>
Created a file for the write up
</commit_message>
<xml_diff>
--- a/EDA_graphs_ppt.pptx
+++ b/EDA_graphs_ppt.pptx
@@ -9954,24 +9954,24 @@
         </p:spPr>
         <p:txBody>
           <a:bodyPr>
-            <a:normAutofit lnSpcReduction="10000"/>
+            <a:normAutofit/>
           </a:bodyPr>
           <a:lstStyle/>
           <a:p>
             <a:r>
-              <a:rPr lang="en-US" sz="2600" dirty="0"/>
+              <a:rPr lang="en-US" sz="2400" dirty="0"/>
               <a:t>Among those who have checked their cholesterol level, more people have diabetes than not.</a:t>
             </a:r>
           </a:p>
           <a:p>
             <a:r>
-              <a:rPr lang="en-US" sz="2600" dirty="0"/>
+              <a:rPr lang="en-US" sz="2400" dirty="0"/>
               <a:t>More people with diabetes reported not having physical activity outside of their job in the past 30 days.</a:t>
             </a:r>
           </a:p>
           <a:p>
             <a:r>
-              <a:rPr lang="en-US" sz="2600" dirty="0"/>
+              <a:rPr lang="en-US" sz="2400" dirty="0"/>
               <a:t>For those with difficulty walking/climbing stairs, more also reported having pre/diabetes</a:t>
             </a:r>
           </a:p>

</xml_diff>